<commit_message>
enhance some of the slides
</commit_message>
<xml_diff>
--- a/08-Polymorphism.pptx
+++ b/08-Polymorphism.pptx
@@ -6045,7 +6045,7 @@
           <a:p>
             <a:fld id="{86D088FE-3E68-47FE-8BA4-634CD34BABBC}" type="datetimeFigureOut">
               <a:rPr lang="en-GB" smtClean="0"/>
-              <a:t>05/12/2025</a:t>
+              <a:t>10/12/2025</a:t>
             </a:fld>
             <a:endParaRPr lang="en-GB"/>
           </a:p>
@@ -6216,7 +6216,7 @@
             <a:fld id="{1D6B66C6-1E92-0F4E-A300-9D4ED1F0C23F}" type="datetimeFigureOut">
               <a:rPr lang="en-GB" smtClean="0"/>
               <a:pPr/>
-              <a:t>05/12/2025</a:t>
+              <a:t>10/12/2025</a:t>
             </a:fld>
             <a:endParaRPr lang="en-GB"/>
           </a:p>
@@ -33947,6 +33947,399 @@
       </p:grpSpPr>
       <p:sp>
         <p:nvSpPr>
+          <p:cNvPr id="24" name="Rectangle 23"/>
+          <p:cNvSpPr/>
+          <p:nvPr/>
+        </p:nvSpPr>
+        <p:spPr>
+          <a:xfrm>
+            <a:off x="2001592" y="3476373"/>
+            <a:ext cx="8352746" cy="2638094"/>
+          </a:xfrm>
+          <a:prstGeom prst="rect">
+            <a:avLst/>
+          </a:prstGeom>
+          <a:solidFill>
+            <a:schemeClr val="accent5">
+              <a:lumMod val="20000"/>
+              <a:lumOff val="80000"/>
+            </a:schemeClr>
+          </a:solidFill>
+          <a:ln w="19050">
+            <a:noFill/>
+          </a:ln>
+          <a:effectLst>
+            <a:outerShdw blurRad="50800" dist="38100" algn="l" rotWithShape="0">
+              <a:prstClr val="black">
+                <a:alpha val="40000"/>
+              </a:prstClr>
+            </a:outerShdw>
+          </a:effectLst>
+        </p:spPr>
+        <p:style>
+          <a:lnRef idx="2">
+            <a:schemeClr val="accent1"/>
+          </a:lnRef>
+          <a:fillRef idx="1">
+            <a:schemeClr val="lt1"/>
+          </a:fillRef>
+          <a:effectRef idx="0">
+            <a:schemeClr val="accent1"/>
+          </a:effectRef>
+          <a:fontRef idx="minor">
+            <a:schemeClr val="dk1"/>
+          </a:fontRef>
+        </p:style>
+        <p:txBody>
+          <a:bodyPr wrap="square">
+            <a:spAutoFit/>
+          </a:bodyPr>
+          <a:lstStyle/>
+          <a:p>
+            <a:pPr>
+              <a:lnSpc>
+                <a:spcPct val="150000"/>
+              </a:lnSpc>
+            </a:pPr>
+            <a:r>
+              <a:rPr lang="en-GB" sz="1600" dirty="0">
+                <a:solidFill>
+                  <a:srgbClr val="000000"/>
+                </a:solidFill>
+                <a:latin typeface="Consolas" panose="020B0609020204030204" pitchFamily="49" charset="0"/>
+              </a:rPr>
+              <a:t>Shape </a:t>
+            </a:r>
+            <a:r>
+              <a:rPr lang="en-GB" sz="1600" dirty="0" err="1">
+                <a:solidFill>
+                  <a:srgbClr val="6A3E3E"/>
+                </a:solidFill>
+                <a:latin typeface="Consolas" panose="020B0609020204030204" pitchFamily="49" charset="0"/>
+              </a:rPr>
+              <a:t>myShape</a:t>
+            </a:r>
+            <a:r>
+              <a:rPr lang="en-GB" sz="1600" dirty="0">
+                <a:solidFill>
+                  <a:srgbClr val="000000"/>
+                </a:solidFill>
+                <a:latin typeface="Consolas" panose="020B0609020204030204" pitchFamily="49" charset="0"/>
+              </a:rPr>
+              <a:t> = </a:t>
+            </a:r>
+            <a:r>
+              <a:rPr lang="en-GB" sz="1600" dirty="0">
+                <a:solidFill>
+                  <a:srgbClr val="7F0055"/>
+                </a:solidFill>
+                <a:latin typeface="Consolas" panose="020B0609020204030204" pitchFamily="49" charset="0"/>
+              </a:rPr>
+              <a:t>new</a:t>
+            </a:r>
+            <a:r>
+              <a:rPr lang="en-GB" sz="1600" dirty="0">
+                <a:solidFill>
+                  <a:srgbClr val="000000"/>
+                </a:solidFill>
+                <a:latin typeface="Consolas" panose="020B0609020204030204" pitchFamily="49" charset="0"/>
+              </a:rPr>
+              <a:t> Shape(</a:t>
+            </a:r>
+            <a:r>
+              <a:rPr lang="en-GB" sz="1600" i="1" dirty="0">
+                <a:solidFill>
+                  <a:srgbClr val="000000"/>
+                </a:solidFill>
+                <a:latin typeface="Consolas" panose="020B0609020204030204" pitchFamily="49" charset="0"/>
+              </a:rPr>
+              <a:t>);</a:t>
+            </a:r>
+          </a:p>
+          <a:p>
+            <a:pPr>
+              <a:lnSpc>
+                <a:spcPct val="150000"/>
+              </a:lnSpc>
+            </a:pPr>
+            <a:r>
+              <a:rPr lang="en-GB" sz="1600" dirty="0">
+                <a:solidFill>
+                  <a:srgbClr val="000000"/>
+                </a:solidFill>
+                <a:latin typeface="Consolas" panose="020B0609020204030204" pitchFamily="49" charset="0"/>
+              </a:rPr>
+              <a:t>Rectangle </a:t>
+            </a:r>
+            <a:r>
+              <a:rPr lang="en-GB" sz="1600" dirty="0" err="1">
+                <a:solidFill>
+                  <a:srgbClr val="6A3E3E"/>
+                </a:solidFill>
+                <a:latin typeface="Consolas" panose="020B0609020204030204" pitchFamily="49" charset="0"/>
+              </a:rPr>
+              <a:t>myRectangle</a:t>
+            </a:r>
+            <a:r>
+              <a:rPr lang="en-GB" sz="1600" dirty="0">
+                <a:solidFill>
+                  <a:srgbClr val="000000"/>
+                </a:solidFill>
+                <a:latin typeface="Consolas" panose="020B0609020204030204" pitchFamily="49" charset="0"/>
+              </a:rPr>
+              <a:t> = </a:t>
+            </a:r>
+            <a:r>
+              <a:rPr lang="en-GB" sz="1600" dirty="0">
+                <a:solidFill>
+                  <a:srgbClr val="7F0055"/>
+                </a:solidFill>
+                <a:latin typeface="Consolas" panose="020B0609020204030204" pitchFamily="49" charset="0"/>
+              </a:rPr>
+              <a:t>new</a:t>
+            </a:r>
+            <a:r>
+              <a:rPr lang="en-GB" sz="1600" dirty="0">
+                <a:solidFill>
+                  <a:srgbClr val="000000"/>
+                </a:solidFill>
+                <a:latin typeface="Consolas" panose="020B0609020204030204" pitchFamily="49" charset="0"/>
+              </a:rPr>
+              <a:t> Rectangle(</a:t>
+            </a:r>
+            <a:r>
+              <a:rPr lang="en-GB" sz="1600" i="1" dirty="0">
+                <a:solidFill>
+                  <a:srgbClr val="000000"/>
+                </a:solidFill>
+                <a:latin typeface="Consolas" panose="020B0609020204030204" pitchFamily="49" charset="0"/>
+              </a:rPr>
+              <a:t>);</a:t>
+            </a:r>
+          </a:p>
+          <a:p>
+            <a:pPr>
+              <a:lnSpc>
+                <a:spcPct val="150000"/>
+              </a:lnSpc>
+            </a:pPr>
+            <a:r>
+              <a:rPr lang="en-GB" sz="1600" dirty="0">
+                <a:solidFill>
+                  <a:srgbClr val="000000"/>
+                </a:solidFill>
+                <a:latin typeface="Consolas" panose="020B0609020204030204" pitchFamily="49" charset="0"/>
+              </a:rPr>
+              <a:t>Shape[] </a:t>
+            </a:r>
+            <a:r>
+              <a:rPr lang="en-GB" sz="1600" dirty="0">
+                <a:solidFill>
+                  <a:srgbClr val="6A3E3E"/>
+                </a:solidFill>
+                <a:latin typeface="Consolas" panose="020B0609020204030204" pitchFamily="49" charset="0"/>
+              </a:rPr>
+              <a:t>shapes</a:t>
+            </a:r>
+            <a:r>
+              <a:rPr lang="en-GB" sz="1600" dirty="0">
+                <a:solidFill>
+                  <a:srgbClr val="000000"/>
+                </a:solidFill>
+                <a:latin typeface="Consolas" panose="020B0609020204030204" pitchFamily="49" charset="0"/>
+              </a:rPr>
+              <a:t> = {</a:t>
+            </a:r>
+            <a:r>
+              <a:rPr lang="en-GB" sz="1600" dirty="0" err="1">
+                <a:solidFill>
+                  <a:srgbClr val="6A3E3E"/>
+                </a:solidFill>
+                <a:latin typeface="Consolas" panose="020B0609020204030204" pitchFamily="49" charset="0"/>
+              </a:rPr>
+              <a:t>myShape</a:t>
+            </a:r>
+            <a:r>
+              <a:rPr lang="en-GB" sz="1600" dirty="0">
+                <a:solidFill>
+                  <a:srgbClr val="6A3E3E"/>
+                </a:solidFill>
+                <a:latin typeface="Consolas" panose="020B0609020204030204" pitchFamily="49" charset="0"/>
+              </a:rPr>
+              <a:t>, </a:t>
+            </a:r>
+            <a:r>
+              <a:rPr lang="en-GB" sz="1600" dirty="0" err="1">
+                <a:solidFill>
+                  <a:srgbClr val="6A3E3E"/>
+                </a:solidFill>
+                <a:latin typeface="Consolas" panose="020B0609020204030204" pitchFamily="49" charset="0"/>
+              </a:rPr>
+              <a:t>myRectangle</a:t>
+            </a:r>
+            <a:r>
+              <a:rPr lang="en-GB" sz="1600" dirty="0">
+                <a:solidFill>
+                  <a:srgbClr val="000000"/>
+                </a:solidFill>
+                <a:latin typeface="Consolas" panose="020B0609020204030204" pitchFamily="49" charset="0"/>
+              </a:rPr>
+              <a:t>};</a:t>
+            </a:r>
+            <a:br>
+              <a:rPr lang="en-GB" sz="1600" dirty="0">
+                <a:solidFill>
+                  <a:srgbClr val="000000"/>
+                </a:solidFill>
+                <a:latin typeface="Consolas" panose="020B0609020204030204" pitchFamily="49" charset="0"/>
+              </a:rPr>
+            </a:br>
+            <a:endParaRPr lang="en-GB" sz="1600" dirty="0">
+              <a:solidFill>
+                <a:srgbClr val="3F7F5F"/>
+              </a:solidFill>
+              <a:latin typeface="Consolas" panose="020B0609020204030204" pitchFamily="49" charset="0"/>
+            </a:endParaRPr>
+          </a:p>
+          <a:p>
+            <a:pPr>
+              <a:lnSpc>
+                <a:spcPct val="150000"/>
+              </a:lnSpc>
+            </a:pPr>
+            <a:r>
+              <a:rPr lang="en-GB" sz="1600" dirty="0">
+                <a:solidFill>
+                  <a:srgbClr val="7F0055"/>
+                </a:solidFill>
+                <a:latin typeface="Consolas" panose="020B0609020204030204" pitchFamily="49" charset="0"/>
+              </a:rPr>
+              <a:t>foreach</a:t>
+            </a:r>
+            <a:r>
+              <a:rPr lang="en-GB" sz="1600" dirty="0">
+                <a:solidFill>
+                  <a:srgbClr val="000000"/>
+                </a:solidFill>
+                <a:latin typeface="Consolas" panose="020B0609020204030204" pitchFamily="49" charset="0"/>
+              </a:rPr>
+              <a:t> (Shape </a:t>
+            </a:r>
+            <a:r>
+              <a:rPr lang="en-GB" sz="1600" dirty="0">
+                <a:solidFill>
+                  <a:srgbClr val="6A3E3E"/>
+                </a:solidFill>
+                <a:latin typeface="Consolas" panose="020B0609020204030204" pitchFamily="49" charset="0"/>
+              </a:rPr>
+              <a:t>s</a:t>
+            </a:r>
+            <a:r>
+              <a:rPr lang="en-GB" sz="1600" dirty="0">
+                <a:solidFill>
+                  <a:srgbClr val="000000"/>
+                </a:solidFill>
+                <a:latin typeface="Consolas" panose="020B0609020204030204" pitchFamily="49" charset="0"/>
+              </a:rPr>
+              <a:t> in </a:t>
+            </a:r>
+            <a:r>
+              <a:rPr lang="en-GB" sz="1600" dirty="0">
+                <a:solidFill>
+                  <a:srgbClr val="6A3E3E"/>
+                </a:solidFill>
+                <a:latin typeface="Consolas" panose="020B0609020204030204" pitchFamily="49" charset="0"/>
+              </a:rPr>
+              <a:t>shapes</a:t>
+            </a:r>
+            <a:r>
+              <a:rPr lang="en-GB" sz="1600" dirty="0">
+                <a:solidFill>
+                  <a:srgbClr val="000000"/>
+                </a:solidFill>
+                <a:latin typeface="Consolas" panose="020B0609020204030204" pitchFamily="49" charset="0"/>
+              </a:rPr>
+              <a:t>)</a:t>
+            </a:r>
+          </a:p>
+          <a:p>
+            <a:pPr>
+              <a:lnSpc>
+                <a:spcPct val="150000"/>
+              </a:lnSpc>
+            </a:pPr>
+            <a:r>
+              <a:rPr lang="en-GB" sz="1600" dirty="0">
+                <a:solidFill>
+                  <a:srgbClr val="000000"/>
+                </a:solidFill>
+                <a:latin typeface="Consolas" panose="020B0609020204030204" pitchFamily="49" charset="0"/>
+              </a:rPr>
+              <a:t>	</a:t>
+            </a:r>
+            <a:r>
+              <a:rPr lang="en-GB" sz="1600" dirty="0" err="1">
+                <a:solidFill>
+                  <a:srgbClr val="000000"/>
+                </a:solidFill>
+                <a:latin typeface="Consolas" panose="020B0609020204030204" pitchFamily="49" charset="0"/>
+              </a:rPr>
+              <a:t>Console.WriteLine</a:t>
+            </a:r>
+            <a:r>
+              <a:rPr lang="en-GB" sz="1600" dirty="0">
+                <a:solidFill>
+                  <a:srgbClr val="000000"/>
+                </a:solidFill>
+                <a:latin typeface="Consolas" panose="020B0609020204030204" pitchFamily="49" charset="0"/>
+              </a:rPr>
+              <a:t>(</a:t>
+            </a:r>
+            <a:r>
+              <a:rPr lang="en-GB" sz="1600" dirty="0" err="1">
+                <a:solidFill>
+                  <a:srgbClr val="6A3E3E"/>
+                </a:solidFill>
+                <a:latin typeface="Consolas" panose="020B0609020204030204" pitchFamily="49" charset="0"/>
+              </a:rPr>
+              <a:t>s</a:t>
+            </a:r>
+            <a:r>
+              <a:rPr lang="en-GB" sz="1600" dirty="0" err="1">
+                <a:solidFill>
+                  <a:srgbClr val="000000"/>
+                </a:solidFill>
+                <a:latin typeface="Consolas" panose="020B0609020204030204" pitchFamily="49" charset="0"/>
+              </a:rPr>
+              <a:t>.getArea</a:t>
+            </a:r>
+            <a:r>
+              <a:rPr lang="en-GB" sz="1600" dirty="0">
+                <a:solidFill>
+                  <a:srgbClr val="000000"/>
+                </a:solidFill>
+                <a:latin typeface="Consolas" panose="020B0609020204030204" pitchFamily="49" charset="0"/>
+              </a:rPr>
+              <a:t>());</a:t>
+            </a:r>
+          </a:p>
+          <a:p>
+            <a:pPr>
+              <a:lnSpc>
+                <a:spcPct val="150000"/>
+              </a:lnSpc>
+            </a:pPr>
+            <a:endParaRPr lang="en-GB" sz="1600" dirty="0">
+              <a:solidFill>
+                <a:srgbClr val="000000"/>
+              </a:solidFill>
+              <a:latin typeface="Consolas" panose="020B0609020204030204" pitchFamily="49" charset="0"/>
+            </a:endParaRPr>
+          </a:p>
+        </p:txBody>
+      </p:sp>
+      <p:sp>
+        <p:nvSpPr>
           <p:cNvPr id="3" name="Title 2"/>
           <p:cNvSpPr>
             <a:spLocks noGrp="1"/>
@@ -34586,8 +34979,8 @@
         </p:nvSpPr>
         <p:spPr>
           <a:xfrm>
-            <a:off x="2001591" y="5117596"/>
-            <a:ext cx="8348639" cy="338554"/>
+            <a:off x="2444239" y="5940101"/>
+            <a:ext cx="7670146" cy="338554"/>
           </a:xfrm>
           <a:prstGeom prst="rect">
             <a:avLst/>
@@ -34637,361 +35030,6 @@
             <a:r>
               <a:rPr lang="en-GB" sz="1600" b="1" dirty="0"/>
               <a:t>() methods are invoked?  Shape or Rectangle?</a:t>
-            </a:r>
-          </a:p>
-        </p:txBody>
-      </p:sp>
-      <p:sp>
-        <p:nvSpPr>
-          <p:cNvPr id="24" name="Rectangle 23"/>
-          <p:cNvSpPr/>
-          <p:nvPr/>
-        </p:nvSpPr>
-        <p:spPr>
-          <a:xfrm>
-            <a:off x="1997485" y="3386818"/>
-            <a:ext cx="8352746" cy="1569660"/>
-          </a:xfrm>
-          <a:prstGeom prst="rect">
-            <a:avLst/>
-          </a:prstGeom>
-          <a:solidFill>
-            <a:schemeClr val="accent5">
-              <a:lumMod val="20000"/>
-              <a:lumOff val="80000"/>
-            </a:schemeClr>
-          </a:solidFill>
-          <a:ln w="19050">
-            <a:noFill/>
-          </a:ln>
-          <a:effectLst>
-            <a:outerShdw blurRad="50800" dist="38100" algn="l" rotWithShape="0">
-              <a:prstClr val="black">
-                <a:alpha val="40000"/>
-              </a:prstClr>
-            </a:outerShdw>
-          </a:effectLst>
-        </p:spPr>
-        <p:style>
-          <a:lnRef idx="2">
-            <a:schemeClr val="accent1"/>
-          </a:lnRef>
-          <a:fillRef idx="1">
-            <a:schemeClr val="lt1"/>
-          </a:fillRef>
-          <a:effectRef idx="0">
-            <a:schemeClr val="accent1"/>
-          </a:effectRef>
-          <a:fontRef idx="minor">
-            <a:schemeClr val="dk1"/>
-          </a:fontRef>
-        </p:style>
-        <p:txBody>
-          <a:bodyPr wrap="square">
-            <a:spAutoFit/>
-          </a:bodyPr>
-          <a:lstStyle/>
-          <a:p>
-            <a:r>
-              <a:rPr lang="en-GB" sz="1600" dirty="0">
-                <a:solidFill>
-                  <a:srgbClr val="000000"/>
-                </a:solidFill>
-                <a:latin typeface="Consolas" panose="020B0609020204030204" pitchFamily="49" charset="0"/>
-              </a:rPr>
-              <a:t>Shape </a:t>
-            </a:r>
-            <a:r>
-              <a:rPr lang="en-GB" sz="1600" dirty="0" err="1">
-                <a:solidFill>
-                  <a:srgbClr val="6A3E3E"/>
-                </a:solidFill>
-                <a:latin typeface="Consolas" panose="020B0609020204030204" pitchFamily="49" charset="0"/>
-              </a:rPr>
-              <a:t>myShape</a:t>
-            </a:r>
-            <a:r>
-              <a:rPr lang="en-GB" sz="1600" dirty="0">
-                <a:solidFill>
-                  <a:srgbClr val="000000"/>
-                </a:solidFill>
-                <a:latin typeface="Consolas" panose="020B0609020204030204" pitchFamily="49" charset="0"/>
-              </a:rPr>
-              <a:t> = </a:t>
-            </a:r>
-            <a:r>
-              <a:rPr lang="en-GB" sz="1600" dirty="0">
-                <a:solidFill>
-                  <a:srgbClr val="7F0055"/>
-                </a:solidFill>
-                <a:latin typeface="Consolas" panose="020B0609020204030204" pitchFamily="49" charset="0"/>
-              </a:rPr>
-              <a:t>new</a:t>
-            </a:r>
-            <a:r>
-              <a:rPr lang="en-GB" sz="1600" dirty="0">
-                <a:solidFill>
-                  <a:srgbClr val="000000"/>
-                </a:solidFill>
-                <a:latin typeface="Consolas" panose="020B0609020204030204" pitchFamily="49" charset="0"/>
-              </a:rPr>
-              <a:t> Shape(</a:t>
-            </a:r>
-            <a:r>
-              <a:rPr lang="en-GB" sz="1600" i="1" dirty="0">
-                <a:solidFill>
-                  <a:srgbClr val="000000"/>
-                </a:solidFill>
-                <a:latin typeface="Consolas" panose="020B0609020204030204" pitchFamily="49" charset="0"/>
-              </a:rPr>
-              <a:t>);</a:t>
-            </a:r>
-          </a:p>
-          <a:p>
-            <a:r>
-              <a:rPr lang="en-GB" sz="1600" dirty="0">
-                <a:solidFill>
-                  <a:srgbClr val="000000"/>
-                </a:solidFill>
-                <a:latin typeface="Consolas" panose="020B0609020204030204" pitchFamily="49" charset="0"/>
-              </a:rPr>
-              <a:t>Rectangle </a:t>
-            </a:r>
-            <a:r>
-              <a:rPr lang="en-GB" sz="1600" dirty="0" err="1">
-                <a:solidFill>
-                  <a:srgbClr val="6A3E3E"/>
-                </a:solidFill>
-                <a:latin typeface="Consolas" panose="020B0609020204030204" pitchFamily="49" charset="0"/>
-              </a:rPr>
-              <a:t>myRectangle</a:t>
-            </a:r>
-            <a:r>
-              <a:rPr lang="en-GB" sz="1600" dirty="0">
-                <a:solidFill>
-                  <a:srgbClr val="000000"/>
-                </a:solidFill>
-                <a:latin typeface="Consolas" panose="020B0609020204030204" pitchFamily="49" charset="0"/>
-              </a:rPr>
-              <a:t> = </a:t>
-            </a:r>
-            <a:r>
-              <a:rPr lang="en-GB" sz="1600" dirty="0">
-                <a:solidFill>
-                  <a:srgbClr val="7F0055"/>
-                </a:solidFill>
-                <a:latin typeface="Consolas" panose="020B0609020204030204" pitchFamily="49" charset="0"/>
-              </a:rPr>
-              <a:t>new</a:t>
-            </a:r>
-            <a:r>
-              <a:rPr lang="en-GB" sz="1600" dirty="0">
-                <a:solidFill>
-                  <a:srgbClr val="000000"/>
-                </a:solidFill>
-                <a:latin typeface="Consolas" panose="020B0609020204030204" pitchFamily="49" charset="0"/>
-              </a:rPr>
-              <a:t> Rectangle(</a:t>
-            </a:r>
-            <a:r>
-              <a:rPr lang="en-GB" sz="1600" i="1" dirty="0">
-                <a:solidFill>
-                  <a:srgbClr val="000000"/>
-                </a:solidFill>
-                <a:latin typeface="Consolas" panose="020B0609020204030204" pitchFamily="49" charset="0"/>
-              </a:rPr>
-              <a:t>);</a:t>
-            </a:r>
-          </a:p>
-          <a:p>
-            <a:r>
-              <a:rPr lang="en-GB" sz="1600" dirty="0">
-                <a:solidFill>
-                  <a:srgbClr val="000000"/>
-                </a:solidFill>
-                <a:latin typeface="Consolas" panose="020B0609020204030204" pitchFamily="49" charset="0"/>
-              </a:rPr>
-              <a:t>Shape[] </a:t>
-            </a:r>
-            <a:r>
-              <a:rPr lang="en-GB" sz="1600" dirty="0">
-                <a:solidFill>
-                  <a:srgbClr val="6A3E3E"/>
-                </a:solidFill>
-                <a:latin typeface="Consolas" panose="020B0609020204030204" pitchFamily="49" charset="0"/>
-              </a:rPr>
-              <a:t>shapes</a:t>
-            </a:r>
-            <a:r>
-              <a:rPr lang="en-GB" sz="1600" dirty="0">
-                <a:solidFill>
-                  <a:srgbClr val="000000"/>
-                </a:solidFill>
-                <a:latin typeface="Consolas" panose="020B0609020204030204" pitchFamily="49" charset="0"/>
-              </a:rPr>
-              <a:t> = {</a:t>
-            </a:r>
-            <a:r>
-              <a:rPr lang="en-GB" sz="1600" dirty="0" err="1">
-                <a:solidFill>
-                  <a:srgbClr val="6A3E3E"/>
-                </a:solidFill>
-                <a:latin typeface="Consolas" panose="020B0609020204030204" pitchFamily="49" charset="0"/>
-              </a:rPr>
-              <a:t>myShape</a:t>
-            </a:r>
-            <a:r>
-              <a:rPr lang="en-GB" sz="1600" dirty="0">
-                <a:solidFill>
-                  <a:srgbClr val="6A3E3E"/>
-                </a:solidFill>
-                <a:latin typeface="Consolas" panose="020B0609020204030204" pitchFamily="49" charset="0"/>
-              </a:rPr>
-              <a:t>, </a:t>
-            </a:r>
-            <a:r>
-              <a:rPr lang="en-GB" sz="1600" dirty="0" err="1">
-                <a:solidFill>
-                  <a:srgbClr val="6A3E3E"/>
-                </a:solidFill>
-                <a:latin typeface="Consolas" panose="020B0609020204030204" pitchFamily="49" charset="0"/>
-              </a:rPr>
-              <a:t>myRectangle</a:t>
-            </a:r>
-            <a:r>
-              <a:rPr lang="en-GB" sz="1600" dirty="0">
-                <a:solidFill>
-                  <a:srgbClr val="000000"/>
-                </a:solidFill>
-                <a:latin typeface="Consolas" panose="020B0609020204030204" pitchFamily="49" charset="0"/>
-              </a:rPr>
-              <a:t>};</a:t>
-            </a:r>
-            <a:br>
-              <a:rPr lang="en-GB" sz="1600" dirty="0">
-                <a:solidFill>
-                  <a:srgbClr val="000000"/>
-                </a:solidFill>
-                <a:latin typeface="Consolas" panose="020B0609020204030204" pitchFamily="49" charset="0"/>
-              </a:rPr>
-            </a:br>
-            <a:endParaRPr lang="en-GB" sz="1600" dirty="0">
-              <a:solidFill>
-                <a:srgbClr val="3F7F5F"/>
-              </a:solidFill>
-              <a:latin typeface="Consolas" panose="020B0609020204030204" pitchFamily="49" charset="0"/>
-            </a:endParaRPr>
-          </a:p>
-          <a:p>
-            <a:r>
-              <a:rPr lang="en-GB" sz="1600" dirty="0">
-                <a:solidFill>
-                  <a:srgbClr val="7F0055"/>
-                </a:solidFill>
-                <a:latin typeface="Consolas" panose="020B0609020204030204" pitchFamily="49" charset="0"/>
-              </a:rPr>
-              <a:t>foreach</a:t>
-            </a:r>
-            <a:r>
-              <a:rPr lang="en-GB" sz="1600" dirty="0">
-                <a:solidFill>
-                  <a:srgbClr val="000000"/>
-                </a:solidFill>
-                <a:latin typeface="Consolas" panose="020B0609020204030204" pitchFamily="49" charset="0"/>
-              </a:rPr>
-              <a:t> (Shape </a:t>
-            </a:r>
-            <a:r>
-              <a:rPr lang="en-GB" sz="1600" dirty="0">
-                <a:solidFill>
-                  <a:srgbClr val="6A3E3E"/>
-                </a:solidFill>
-                <a:latin typeface="Consolas" panose="020B0609020204030204" pitchFamily="49" charset="0"/>
-              </a:rPr>
-              <a:t>s</a:t>
-            </a:r>
-            <a:r>
-              <a:rPr lang="en-GB" sz="1600" dirty="0">
-                <a:solidFill>
-                  <a:srgbClr val="000000"/>
-                </a:solidFill>
-                <a:latin typeface="Consolas" panose="020B0609020204030204" pitchFamily="49" charset="0"/>
-              </a:rPr>
-              <a:t> in </a:t>
-            </a:r>
-            <a:r>
-              <a:rPr lang="en-GB" sz="1600" dirty="0">
-                <a:solidFill>
-                  <a:srgbClr val="6A3E3E"/>
-                </a:solidFill>
-                <a:latin typeface="Consolas" panose="020B0609020204030204" pitchFamily="49" charset="0"/>
-              </a:rPr>
-              <a:t>shapes</a:t>
-            </a:r>
-            <a:r>
-              <a:rPr lang="en-GB" sz="1600" dirty="0">
-                <a:solidFill>
-                  <a:srgbClr val="000000"/>
-                </a:solidFill>
-                <a:latin typeface="Consolas" panose="020B0609020204030204" pitchFamily="49" charset="0"/>
-              </a:rPr>
-              <a:t>)</a:t>
-            </a:r>
-          </a:p>
-          <a:p>
-            <a:r>
-              <a:rPr lang="en-GB" sz="1600" dirty="0">
-                <a:solidFill>
-                  <a:srgbClr val="000000"/>
-                </a:solidFill>
-                <a:latin typeface="Consolas" panose="020B0609020204030204" pitchFamily="49" charset="0"/>
-              </a:rPr>
-              <a:t>	</a:t>
-            </a:r>
-            <a:r>
-              <a:rPr lang="en-GB" sz="1600" dirty="0" err="1">
-                <a:solidFill>
-                  <a:srgbClr val="000000"/>
-                </a:solidFill>
-                <a:latin typeface="Consolas" panose="020B0609020204030204" pitchFamily="49" charset="0"/>
-              </a:rPr>
-              <a:t>Console.WriteLine</a:t>
-            </a:r>
-            <a:r>
-              <a:rPr lang="en-GB" sz="1600" dirty="0">
-                <a:solidFill>
-                  <a:srgbClr val="000000"/>
-                </a:solidFill>
-                <a:latin typeface="Consolas" panose="020B0609020204030204" pitchFamily="49" charset="0"/>
-              </a:rPr>
-              <a:t>(</a:t>
-            </a:r>
-            <a:r>
-              <a:rPr lang="en-GB" sz="1600" dirty="0" err="1">
-                <a:solidFill>
-                  <a:srgbClr val="6A3E3E"/>
-                </a:solidFill>
-                <a:latin typeface="Consolas" panose="020B0609020204030204" pitchFamily="49" charset="0"/>
-              </a:rPr>
-              <a:t>s</a:t>
-            </a:r>
-            <a:r>
-              <a:rPr lang="en-GB" sz="1600" dirty="0" err="1">
-                <a:solidFill>
-                  <a:srgbClr val="000000"/>
-                </a:solidFill>
-                <a:latin typeface="Consolas" panose="020B0609020204030204" pitchFamily="49" charset="0"/>
-              </a:rPr>
-              <a:t>.getArea</a:t>
-            </a:r>
-            <a:r>
-              <a:rPr lang="en-GB" sz="1600" dirty="0">
-                <a:solidFill>
-                  <a:srgbClr val="000000"/>
-                </a:solidFill>
-                <a:latin typeface="Consolas" panose="020B0609020204030204" pitchFamily="49" charset="0"/>
-              </a:rPr>
-              <a:t>());</a:t>
             </a:r>
           </a:p>
         </p:txBody>
@@ -35078,57 +35116,6 @@
             <a:r>
               <a:rPr lang="en-GB" dirty="0"/>
               <a:t>The data type of a reference that controls what is ‘visible’ </a:t>
-            </a:r>
-          </a:p>
-        </p:txBody>
-      </p:sp>
-      <p:sp>
-        <p:nvSpPr>
-          <p:cNvPr id="10" name="Rectangle 9"/>
-          <p:cNvSpPr>
-            <a:spLocks noChangeArrowheads="1"/>
-          </p:cNvSpPr>
-          <p:nvPr/>
-        </p:nvSpPr>
-        <p:spPr bwMode="auto">
-          <a:xfrm>
-            <a:off x="3152123" y="5772370"/>
-            <a:ext cx="5096931" cy="369332"/>
-          </a:xfrm>
-          <a:prstGeom prst="rect">
-            <a:avLst/>
-          </a:prstGeom>
-          <a:solidFill>
-            <a:schemeClr val="bg1"/>
-          </a:solidFill>
-          <a:ln w="19050">
-            <a:noFill/>
-            <a:miter lim="800000"/>
-            <a:headEnd/>
-            <a:tailEnd/>
-          </a:ln>
-          <a:effectLst>
-            <a:outerShdw blurRad="50800" dist="38100" algn="l" rotWithShape="0">
-              <a:prstClr val="black">
-                <a:alpha val="40000"/>
-              </a:prstClr>
-            </a:outerShdw>
-          </a:effectLst>
-        </p:spPr>
-        <p:txBody>
-          <a:bodyPr wrap="square" anchor="ctr">
-            <a:spAutoFit/>
-          </a:bodyPr>
-          <a:lstStyle/>
-          <a:p>
-            <a:pPr algn="ctr" eaLnBrk="0" hangingPunct="0">
-              <a:spcBef>
-                <a:spcPct val="50000"/>
-              </a:spcBef>
-            </a:pPr>
-            <a:r>
-              <a:rPr lang="en-GB" b="1" dirty="0"/>
-              <a:t>Compiles but will it crash at runtime?</a:t>
             </a:r>
           </a:p>
         </p:txBody>
@@ -35356,7 +35343,7 @@
         <p:spPr>
           <a:xfrm>
             <a:off x="1546752" y="3544899"/>
-            <a:ext cx="9416320" cy="2062103"/>
+            <a:ext cx="9416320" cy="2638094"/>
           </a:xfrm>
           <a:prstGeom prst="rect">
             <a:avLst/>
@@ -35398,6 +35385,11 @@
           </a:bodyPr>
           <a:lstStyle/>
           <a:p>
+            <a:pPr>
+              <a:lnSpc>
+                <a:spcPct val="150000"/>
+              </a:lnSpc>
+            </a:pPr>
             <a:r>
               <a:rPr lang="en-GB" sz="1600" b="1" dirty="0">
                 <a:solidFill>
@@ -35463,6 +35455,11 @@
             </a:r>
           </a:p>
           <a:p>
+            <a:pPr>
+              <a:lnSpc>
+                <a:spcPct val="150000"/>
+              </a:lnSpc>
+            </a:pPr>
             <a:r>
               <a:rPr lang="en-GB" sz="1600" b="1" dirty="0">
                 <a:solidFill>
@@ -35525,6 +35522,11 @@
             </a:endParaRPr>
           </a:p>
           <a:p>
+            <a:pPr>
+              <a:lnSpc>
+                <a:spcPct val="150000"/>
+              </a:lnSpc>
+            </a:pPr>
             <a:r>
               <a:rPr lang="en-GB" sz="1600" b="1" dirty="0">
                 <a:solidFill>
@@ -35590,6 +35592,11 @@
             </a:r>
           </a:p>
           <a:p>
+            <a:pPr>
+              <a:lnSpc>
+                <a:spcPct val="150000"/>
+              </a:lnSpc>
+            </a:pPr>
             <a:r>
               <a:rPr lang="en-GB" sz="1600" b="1" dirty="0">
                 <a:solidFill>
@@ -35653,8 +35660,6 @@
               </a:rPr>
               <a:t>// Person -no subject</a:t>
             </a:r>
-          </a:p>
-          <a:p>
             <a:endParaRPr lang="en-GB" sz="1600" b="1" dirty="0">
               <a:solidFill>
                 <a:srgbClr val="000000"/>
@@ -35663,6 +35668,11 @@
             </a:endParaRPr>
           </a:p>
           <a:p>
+            <a:pPr>
+              <a:lnSpc>
+                <a:spcPct val="150000"/>
+              </a:lnSpc>
+            </a:pPr>
             <a:r>
               <a:rPr lang="en-GB" sz="1600" b="1" dirty="0">
                 <a:solidFill>
@@ -35719,6 +35729,11 @@
             </a:r>
           </a:p>
           <a:p>
+            <a:pPr>
+              <a:lnSpc>
+                <a:spcPct val="150000"/>
+              </a:lnSpc>
+            </a:pPr>
             <a:r>
               <a:rPr lang="en-GB" sz="1600" b="1" dirty="0">
                 <a:solidFill>
@@ -35784,6 +35799,11 @@
             </a:r>
           </a:p>
           <a:p>
+            <a:pPr>
+              <a:lnSpc>
+                <a:spcPct val="150000"/>
+              </a:lnSpc>
+            </a:pPr>
             <a:r>
               <a:rPr lang="en-GB" sz="1600" b="1" dirty="0">
                 <a:solidFill>
@@ -36024,6 +36044,57 @@
                 <a:latin typeface="Consolas" panose="020B0609020204030204" pitchFamily="49" charset="0"/>
               </a:rPr>
               <a:t>}</a:t>
+            </a:r>
+          </a:p>
+        </p:txBody>
+      </p:sp>
+      <p:sp>
+        <p:nvSpPr>
+          <p:cNvPr id="10" name="Rectangle 9"/>
+          <p:cNvSpPr>
+            <a:spLocks noChangeArrowheads="1"/>
+          </p:cNvSpPr>
+          <p:nvPr/>
+        </p:nvSpPr>
+        <p:spPr bwMode="auto">
+          <a:xfrm>
+            <a:off x="2944034" y="6036075"/>
+            <a:ext cx="5096931" cy="369332"/>
+          </a:xfrm>
+          <a:prstGeom prst="rect">
+            <a:avLst/>
+          </a:prstGeom>
+          <a:solidFill>
+            <a:schemeClr val="bg1"/>
+          </a:solidFill>
+          <a:ln w="19050">
+            <a:noFill/>
+            <a:miter lim="800000"/>
+            <a:headEnd/>
+            <a:tailEnd/>
+          </a:ln>
+          <a:effectLst>
+            <a:outerShdw blurRad="50800" dist="38100" algn="l" rotWithShape="0">
+              <a:prstClr val="black">
+                <a:alpha val="40000"/>
+              </a:prstClr>
+            </a:outerShdw>
+          </a:effectLst>
+        </p:spPr>
+        <p:txBody>
+          <a:bodyPr wrap="square" anchor="ctr">
+            <a:spAutoFit/>
+          </a:bodyPr>
+          <a:lstStyle/>
+          <a:p>
+            <a:pPr algn="ctr" eaLnBrk="0" hangingPunct="0">
+              <a:spcBef>
+                <a:spcPct val="50000"/>
+              </a:spcBef>
+            </a:pPr>
+            <a:r>
+              <a:rPr lang="en-GB" b="1" dirty="0"/>
+              <a:t>Compiles but will it crash at runtime?</a:t>
             </a:r>
           </a:p>
         </p:txBody>
@@ -45185,20 +45256,12 @@
 </file>
 
 <file path=customXml/item1.xml><?xml version="1.0" encoding="utf-8"?>
-<p:properties xmlns:p="http://schemas.microsoft.com/office/2006/metadata/properties" xmlns:xsi="http://www.w3.org/2001/XMLSchema-instance" xmlns:pc="http://schemas.microsoft.com/office/infopath/2007/PartnerControls">
-  <documentManagement>
-    <SequenceNumber xmlns="6794D9DE-4FDF-4DC0-8B2C-5438320C69D5" xsi:nil="true"/>
-    <IsBuildFile xmlns="6794D9DE-4FDF-4DC0-8B2C-5438320C69D5" xsi:nil="true"/>
-    <BookTypeField0 xmlns="6794D9DE-4FDF-4DC0-8B2C-5438320C69D5">
-      <Terms xmlns="http://schemas.microsoft.com/office/infopath/2007/PartnerControls">
-        <TermInfo xmlns="http://schemas.microsoft.com/office/infopath/2007/PartnerControls">
-          <TermName xmlns="http://schemas.microsoft.com/office/infopath/2007/PartnerControls">IK</TermName>
-          <TermId xmlns="http://schemas.microsoft.com/office/infopath/2007/PartnerControls">5abe6401-e87a-4499-80b4-3d21a1a6ebd7</TermId>
-        </TermInfo>
-      </Terms>
-    </BookTypeField0>
-  </documentManagement>
-</p:properties>
+<?mso-contentType ?>
+<FormTemplates xmlns="http://schemas.microsoft.com/sharepoint/v3/contenttype/forms">
+  <Display>DocumentLibraryForm</Display>
+  <Edit>DocumentLibraryForm</Edit>
+  <New>DocumentLibraryForm</New>
+</FormTemplates>
 </file>
 
 <file path=customXml/item2.xml><?xml version="1.0" encoding="utf-8"?>
@@ -45342,26 +45405,26 @@
 </file>
 
 <file path=customXml/item3.xml><?xml version="1.0" encoding="utf-8"?>
-<?mso-contentType ?>
-<FormTemplates xmlns="http://schemas.microsoft.com/sharepoint/v3/contenttype/forms">
-  <Display>DocumentLibraryForm</Display>
-  <Edit>DocumentLibraryForm</Edit>
-  <New>DocumentLibraryForm</New>
-</FormTemplates>
+<p:properties xmlns:p="http://schemas.microsoft.com/office/2006/metadata/properties" xmlns:xsi="http://www.w3.org/2001/XMLSchema-instance" xmlns:pc="http://schemas.microsoft.com/office/infopath/2007/PartnerControls">
+  <documentManagement>
+    <SequenceNumber xmlns="6794D9DE-4FDF-4DC0-8B2C-5438320C69D5" xsi:nil="true"/>
+    <IsBuildFile xmlns="6794D9DE-4FDF-4DC0-8B2C-5438320C69D5" xsi:nil="true"/>
+    <BookTypeField0 xmlns="6794D9DE-4FDF-4DC0-8B2C-5438320C69D5">
+      <Terms xmlns="http://schemas.microsoft.com/office/infopath/2007/PartnerControls">
+        <TermInfo xmlns="http://schemas.microsoft.com/office/infopath/2007/PartnerControls">
+          <TermName xmlns="http://schemas.microsoft.com/office/infopath/2007/PartnerControls">IK</TermName>
+          <TermId xmlns="http://schemas.microsoft.com/office/infopath/2007/PartnerControls">5abe6401-e87a-4499-80b4-3d21a1a6ebd7</TermId>
+        </TermInfo>
+      </Terms>
+    </BookTypeField0>
+  </documentManagement>
+</p:properties>
 </file>
 
 <file path=customXml/itemProps1.xml><?xml version="1.0" encoding="utf-8"?>
-<ds:datastoreItem xmlns:ds="http://schemas.openxmlformats.org/officeDocument/2006/customXml" ds:itemID="{8B002782-C0E5-4A6E-ADDD-C83D4552F6A7}">
+<ds:datastoreItem xmlns:ds="http://schemas.openxmlformats.org/officeDocument/2006/customXml" ds:itemID="{49B953F8-652C-430A-8D9D-5F0B70E6D45D}">
   <ds:schemaRefs>
-    <ds:schemaRef ds:uri="http://schemas.microsoft.com/office/infopath/2007/PartnerControls"/>
-    <ds:schemaRef ds:uri="http://www.w3.org/XML/1998/namespace"/>
-    <ds:schemaRef ds:uri="http://purl.org/dc/dcmitype/"/>
-    <ds:schemaRef ds:uri="http://schemas.openxmlformats.org/package/2006/metadata/core-properties"/>
-    <ds:schemaRef ds:uri="http://purl.org/dc/terms/"/>
-    <ds:schemaRef ds:uri="http://schemas.microsoft.com/office/2006/documentManagement/types"/>
-    <ds:schemaRef ds:uri="http://purl.org/dc/elements/1.1/"/>
-    <ds:schemaRef ds:uri="6794D9DE-4FDF-4DC0-8B2C-5438320C69D5"/>
-    <ds:schemaRef ds:uri="http://schemas.microsoft.com/office/2006/metadata/properties"/>
+    <ds:schemaRef ds:uri="http://schemas.microsoft.com/sharepoint/v3/contenttype/forms"/>
   </ds:schemaRefs>
 </ds:datastoreItem>
 </file>
@@ -45385,9 +45448,17 @@
 </file>
 
 <file path=customXml/itemProps3.xml><?xml version="1.0" encoding="utf-8"?>
-<ds:datastoreItem xmlns:ds="http://schemas.openxmlformats.org/officeDocument/2006/customXml" ds:itemID="{49B953F8-652C-430A-8D9D-5F0B70E6D45D}">
+<ds:datastoreItem xmlns:ds="http://schemas.openxmlformats.org/officeDocument/2006/customXml" ds:itemID="{8B002782-C0E5-4A6E-ADDD-C83D4552F6A7}">
   <ds:schemaRefs>
-    <ds:schemaRef ds:uri="http://schemas.microsoft.com/sharepoint/v3/contenttype/forms"/>
+    <ds:schemaRef ds:uri="http://schemas.microsoft.com/office/infopath/2007/PartnerControls"/>
+    <ds:schemaRef ds:uri="http://www.w3.org/XML/1998/namespace"/>
+    <ds:schemaRef ds:uri="http://purl.org/dc/dcmitype/"/>
+    <ds:schemaRef ds:uri="http://schemas.openxmlformats.org/package/2006/metadata/core-properties"/>
+    <ds:schemaRef ds:uri="http://purl.org/dc/terms/"/>
+    <ds:schemaRef ds:uri="http://schemas.microsoft.com/office/2006/documentManagement/types"/>
+    <ds:schemaRef ds:uri="http://purl.org/dc/elements/1.1/"/>
+    <ds:schemaRef ds:uri="6794D9DE-4FDF-4DC0-8B2C-5438320C69D5"/>
+    <ds:schemaRef ds:uri="http://schemas.microsoft.com/office/2006/metadata/properties"/>
   </ds:schemaRefs>
 </ds:datastoreItem>
 </file>
</xml_diff>